<commit_message>
Tippfehler beseitigt im PPTx
</commit_message>
<xml_diff>
--- a/Lernstrategien/Morphologischer Kasten BioPrime.pptx
+++ b/Lernstrategien/Morphologischer Kasten BioPrime.pptx
@@ -106,7 +106,7 @@
   </p:defaultTextStyle>
   <p:extLst>
     <p:ext uri="{EFAFB233-063F-42B5-8137-9DF3F51BA10A}">
-      <p15:sldGuideLst xmlns:p15="http://schemas.microsoft.com/office/powerpoint/2012/main" xmlns="">
+      <p15:sldGuideLst xmlns:p15="http://schemas.microsoft.com/office/powerpoint/2012/main">
         <p15:guide id="1" orient="horz" pos="2160" userDrawn="1">
           <p15:clr>
             <a:srgbClr val="A4A3A4"/>
@@ -121,10 +121,6 @@
     </p:ext>
   </p:extLst>
 </p:presentation>
-</file>
-
-<file path=ppt/revisionInfo.xml><?xml version="1.0" encoding="utf-8"?>
-<p1510:revInfo xmlns:a="http://schemas.openxmlformats.org/drawingml/2006/main" xmlns:r="http://schemas.openxmlformats.org/officeDocument/2006/relationships" xmlns:p1510="http://schemas.microsoft.com/office/powerpoint/2015/10/main"/>
 </file>
 
 <file path=ppt/slideLayouts/slideLayout1.xml><?xml version="1.0" encoding="utf-8"?>
@@ -149,7 +145,7 @@
           <p:cNvPr id="2" name="Titel 1">
             <a:extLst>
               <a:ext uri="{FF2B5EF4-FFF2-40B4-BE49-F238E27FC236}">
-                <a16:creationId xmlns:a16="http://schemas.microsoft.com/office/drawing/2014/main" xmlns="" id="{12CB9376-A593-444E-9BCF-D43120065060}"/>
+                <a16:creationId xmlns:a16="http://schemas.microsoft.com/office/drawing/2014/main" id="{12CB9376-A593-444E-9BCF-D43120065060}"/>
               </a:ext>
             </a:extLst>
           </p:cNvPr>
@@ -186,7 +182,7 @@
           <p:cNvPr id="3" name="Untertitel 2">
             <a:extLst>
               <a:ext uri="{FF2B5EF4-FFF2-40B4-BE49-F238E27FC236}">
-                <a16:creationId xmlns:a16="http://schemas.microsoft.com/office/drawing/2014/main" xmlns="" id="{7F2C450D-5B8B-4540-B547-BC754673B1BE}"/>
+                <a16:creationId xmlns:a16="http://schemas.microsoft.com/office/drawing/2014/main" id="{7F2C450D-5B8B-4540-B547-BC754673B1BE}"/>
               </a:ext>
             </a:extLst>
           </p:cNvPr>
@@ -256,7 +252,7 @@
           <p:cNvPr id="4" name="Datumsplatzhalter 3">
             <a:extLst>
               <a:ext uri="{FF2B5EF4-FFF2-40B4-BE49-F238E27FC236}">
-                <a16:creationId xmlns:a16="http://schemas.microsoft.com/office/drawing/2014/main" xmlns="" id="{78BA29ED-D90E-4AFC-BF7F-052E721E8C2D}"/>
+                <a16:creationId xmlns:a16="http://schemas.microsoft.com/office/drawing/2014/main" id="{78BA29ED-D90E-4AFC-BF7F-052E721E8C2D}"/>
               </a:ext>
             </a:extLst>
           </p:cNvPr>
@@ -275,7 +271,7 @@
             <a:fld id="{EF2A35CB-578F-4832-A0CE-F029506BB1A4}" type="datetimeFigureOut">
               <a:rPr lang="de-DE" smtClean="0"/>
               <a:pPr/>
-              <a:t>13.08.2017</a:t>
+              <a:t>28.02.18</a:t>
             </a:fld>
             <a:endParaRPr lang="de-DE"/>
           </a:p>
@@ -286,7 +282,7 @@
           <p:cNvPr id="5" name="Fußzeilenplatzhalter 4">
             <a:extLst>
               <a:ext uri="{FF2B5EF4-FFF2-40B4-BE49-F238E27FC236}">
-                <a16:creationId xmlns:a16="http://schemas.microsoft.com/office/drawing/2014/main" xmlns="" id="{7BCBEC9A-46F5-4C4D-BB1D-8AC92A162670}"/>
+                <a16:creationId xmlns:a16="http://schemas.microsoft.com/office/drawing/2014/main" id="{7BCBEC9A-46F5-4C4D-BB1D-8AC92A162670}"/>
               </a:ext>
             </a:extLst>
           </p:cNvPr>
@@ -311,7 +307,7 @@
           <p:cNvPr id="6" name="Foliennummernplatzhalter 5">
             <a:extLst>
               <a:ext uri="{FF2B5EF4-FFF2-40B4-BE49-F238E27FC236}">
-                <a16:creationId xmlns:a16="http://schemas.microsoft.com/office/drawing/2014/main" xmlns="" id="{D21D4525-630E-41A8-BA02-F71C0F672B7A}"/>
+                <a16:creationId xmlns:a16="http://schemas.microsoft.com/office/drawing/2014/main" id="{D21D4525-630E-41A8-BA02-F71C0F672B7A}"/>
               </a:ext>
             </a:extLst>
           </p:cNvPr>
@@ -330,7 +326,7 @@
             <a:fld id="{C3CA5D77-34DE-49AF-8B1F-A6673D6EB223}" type="slidenum">
               <a:rPr lang="de-DE" smtClean="0"/>
               <a:pPr/>
-              <a:t>‹Nr.›</a:t>
+              <a:t>‹#›</a:t>
             </a:fld>
             <a:endParaRPr lang="de-DE"/>
           </a:p>
@@ -339,7 +335,7 @@
     </p:spTree>
     <p:extLst>
       <p:ext uri="{BB962C8B-B14F-4D97-AF65-F5344CB8AC3E}">
-        <p14:creationId xmlns:p14="http://schemas.microsoft.com/office/powerpoint/2010/main" xmlns="" val="3278204123"/>
+        <p14:creationId xmlns:p14="http://schemas.microsoft.com/office/powerpoint/2010/main" val="3278204123"/>
       </p:ext>
     </p:extLst>
   </p:cSld>
@@ -371,7 +367,7 @@
           <p:cNvPr id="2" name="Titel 1">
             <a:extLst>
               <a:ext uri="{FF2B5EF4-FFF2-40B4-BE49-F238E27FC236}">
-                <a16:creationId xmlns:a16="http://schemas.microsoft.com/office/drawing/2014/main" xmlns="" id="{5042B521-A328-40E8-9CB9-EC72D4052FD7}"/>
+                <a16:creationId xmlns:a16="http://schemas.microsoft.com/office/drawing/2014/main" id="{5042B521-A328-40E8-9CB9-EC72D4052FD7}"/>
               </a:ext>
             </a:extLst>
           </p:cNvPr>
@@ -399,7 +395,7 @@
           <p:cNvPr id="3" name="Vertikaler Textplatzhalter 2">
             <a:extLst>
               <a:ext uri="{FF2B5EF4-FFF2-40B4-BE49-F238E27FC236}">
-                <a16:creationId xmlns:a16="http://schemas.microsoft.com/office/drawing/2014/main" xmlns="" id="{15BA02D9-D0BB-4A8E-B09D-D3BB5EA5BB62}"/>
+                <a16:creationId xmlns:a16="http://schemas.microsoft.com/office/drawing/2014/main" id="{15BA02D9-D0BB-4A8E-B09D-D3BB5EA5BB62}"/>
               </a:ext>
             </a:extLst>
           </p:cNvPr>
@@ -456,7 +452,7 @@
           <p:cNvPr id="4" name="Datumsplatzhalter 3">
             <a:extLst>
               <a:ext uri="{FF2B5EF4-FFF2-40B4-BE49-F238E27FC236}">
-                <a16:creationId xmlns:a16="http://schemas.microsoft.com/office/drawing/2014/main" xmlns="" id="{585B5AA1-B4F8-4F7B-AB04-E068F7DF49CB}"/>
+                <a16:creationId xmlns:a16="http://schemas.microsoft.com/office/drawing/2014/main" id="{585B5AA1-B4F8-4F7B-AB04-E068F7DF49CB}"/>
               </a:ext>
             </a:extLst>
           </p:cNvPr>
@@ -475,7 +471,7 @@
             <a:fld id="{EF2A35CB-578F-4832-A0CE-F029506BB1A4}" type="datetimeFigureOut">
               <a:rPr lang="de-DE" smtClean="0"/>
               <a:pPr/>
-              <a:t>13.08.2017</a:t>
+              <a:t>28.02.18</a:t>
             </a:fld>
             <a:endParaRPr lang="de-DE"/>
           </a:p>
@@ -486,7 +482,7 @@
           <p:cNvPr id="5" name="Fußzeilenplatzhalter 4">
             <a:extLst>
               <a:ext uri="{FF2B5EF4-FFF2-40B4-BE49-F238E27FC236}">
-                <a16:creationId xmlns:a16="http://schemas.microsoft.com/office/drawing/2014/main" xmlns="" id="{14AF4D19-6B8D-4F3E-BC44-6D1839D8D519}"/>
+                <a16:creationId xmlns:a16="http://schemas.microsoft.com/office/drawing/2014/main" id="{14AF4D19-6B8D-4F3E-BC44-6D1839D8D519}"/>
               </a:ext>
             </a:extLst>
           </p:cNvPr>
@@ -511,7 +507,7 @@
           <p:cNvPr id="6" name="Foliennummernplatzhalter 5">
             <a:extLst>
               <a:ext uri="{FF2B5EF4-FFF2-40B4-BE49-F238E27FC236}">
-                <a16:creationId xmlns:a16="http://schemas.microsoft.com/office/drawing/2014/main" xmlns="" id="{39673D17-D3FC-40E1-B3A5-50A71BB7D4A3}"/>
+                <a16:creationId xmlns:a16="http://schemas.microsoft.com/office/drawing/2014/main" id="{39673D17-D3FC-40E1-B3A5-50A71BB7D4A3}"/>
               </a:ext>
             </a:extLst>
           </p:cNvPr>
@@ -530,7 +526,7 @@
             <a:fld id="{C3CA5D77-34DE-49AF-8B1F-A6673D6EB223}" type="slidenum">
               <a:rPr lang="de-DE" smtClean="0"/>
               <a:pPr/>
-              <a:t>‹Nr.›</a:t>
+              <a:t>‹#›</a:t>
             </a:fld>
             <a:endParaRPr lang="de-DE"/>
           </a:p>
@@ -539,7 +535,7 @@
     </p:spTree>
     <p:extLst>
       <p:ext uri="{BB962C8B-B14F-4D97-AF65-F5344CB8AC3E}">
-        <p14:creationId xmlns:p14="http://schemas.microsoft.com/office/powerpoint/2010/main" xmlns="" val="1633839659"/>
+        <p14:creationId xmlns:p14="http://schemas.microsoft.com/office/powerpoint/2010/main" val="1633839659"/>
       </p:ext>
     </p:extLst>
   </p:cSld>
@@ -571,7 +567,7 @@
           <p:cNvPr id="2" name="Vertikaler Titel 1">
             <a:extLst>
               <a:ext uri="{FF2B5EF4-FFF2-40B4-BE49-F238E27FC236}">
-                <a16:creationId xmlns:a16="http://schemas.microsoft.com/office/drawing/2014/main" xmlns="" id="{D5232F80-9B0D-4A97-A819-29D6595F8BE9}"/>
+                <a16:creationId xmlns:a16="http://schemas.microsoft.com/office/drawing/2014/main" id="{D5232F80-9B0D-4A97-A819-29D6595F8BE9}"/>
               </a:ext>
             </a:extLst>
           </p:cNvPr>
@@ -604,7 +600,7 @@
           <p:cNvPr id="3" name="Vertikaler Textplatzhalter 2">
             <a:extLst>
               <a:ext uri="{FF2B5EF4-FFF2-40B4-BE49-F238E27FC236}">
-                <a16:creationId xmlns:a16="http://schemas.microsoft.com/office/drawing/2014/main" xmlns="" id="{42C7C39D-4EE8-4CE3-B5A3-43289893E35D}"/>
+                <a16:creationId xmlns:a16="http://schemas.microsoft.com/office/drawing/2014/main" id="{42C7C39D-4EE8-4CE3-B5A3-43289893E35D}"/>
               </a:ext>
             </a:extLst>
           </p:cNvPr>
@@ -666,7 +662,7 @@
           <p:cNvPr id="4" name="Datumsplatzhalter 3">
             <a:extLst>
               <a:ext uri="{FF2B5EF4-FFF2-40B4-BE49-F238E27FC236}">
-                <a16:creationId xmlns:a16="http://schemas.microsoft.com/office/drawing/2014/main" xmlns="" id="{41D61290-9CE8-40E8-8722-F8137312809A}"/>
+                <a16:creationId xmlns:a16="http://schemas.microsoft.com/office/drawing/2014/main" id="{41D61290-9CE8-40E8-8722-F8137312809A}"/>
               </a:ext>
             </a:extLst>
           </p:cNvPr>
@@ -685,7 +681,7 @@
             <a:fld id="{EF2A35CB-578F-4832-A0CE-F029506BB1A4}" type="datetimeFigureOut">
               <a:rPr lang="de-DE" smtClean="0"/>
               <a:pPr/>
-              <a:t>13.08.2017</a:t>
+              <a:t>28.02.18</a:t>
             </a:fld>
             <a:endParaRPr lang="de-DE"/>
           </a:p>
@@ -696,7 +692,7 @@
           <p:cNvPr id="5" name="Fußzeilenplatzhalter 4">
             <a:extLst>
               <a:ext uri="{FF2B5EF4-FFF2-40B4-BE49-F238E27FC236}">
-                <a16:creationId xmlns:a16="http://schemas.microsoft.com/office/drawing/2014/main" xmlns="" id="{B45AD9C1-572A-4D8F-A664-3F02ACF2AC38}"/>
+                <a16:creationId xmlns:a16="http://schemas.microsoft.com/office/drawing/2014/main" id="{B45AD9C1-572A-4D8F-A664-3F02ACF2AC38}"/>
               </a:ext>
             </a:extLst>
           </p:cNvPr>
@@ -721,7 +717,7 @@
           <p:cNvPr id="6" name="Foliennummernplatzhalter 5">
             <a:extLst>
               <a:ext uri="{FF2B5EF4-FFF2-40B4-BE49-F238E27FC236}">
-                <a16:creationId xmlns:a16="http://schemas.microsoft.com/office/drawing/2014/main" xmlns="" id="{AD467424-B776-4B90-9970-95DCD367D633}"/>
+                <a16:creationId xmlns:a16="http://schemas.microsoft.com/office/drawing/2014/main" id="{AD467424-B776-4B90-9970-95DCD367D633}"/>
               </a:ext>
             </a:extLst>
           </p:cNvPr>
@@ -740,7 +736,7 @@
             <a:fld id="{C3CA5D77-34DE-49AF-8B1F-A6673D6EB223}" type="slidenum">
               <a:rPr lang="de-DE" smtClean="0"/>
               <a:pPr/>
-              <a:t>‹Nr.›</a:t>
+              <a:t>‹#›</a:t>
             </a:fld>
             <a:endParaRPr lang="de-DE"/>
           </a:p>
@@ -749,7 +745,7 @@
     </p:spTree>
     <p:extLst>
       <p:ext uri="{BB962C8B-B14F-4D97-AF65-F5344CB8AC3E}">
-        <p14:creationId xmlns:p14="http://schemas.microsoft.com/office/powerpoint/2010/main" xmlns="" val="762139654"/>
+        <p14:creationId xmlns:p14="http://schemas.microsoft.com/office/powerpoint/2010/main" val="762139654"/>
       </p:ext>
     </p:extLst>
   </p:cSld>
@@ -781,7 +777,7 @@
           <p:cNvPr id="2" name="Titel 1">
             <a:extLst>
               <a:ext uri="{FF2B5EF4-FFF2-40B4-BE49-F238E27FC236}">
-                <a16:creationId xmlns:a16="http://schemas.microsoft.com/office/drawing/2014/main" xmlns="" id="{3F0EAE0B-E8F8-4C3A-BE67-7B12E346D189}"/>
+                <a16:creationId xmlns:a16="http://schemas.microsoft.com/office/drawing/2014/main" id="{3F0EAE0B-E8F8-4C3A-BE67-7B12E346D189}"/>
               </a:ext>
             </a:extLst>
           </p:cNvPr>
@@ -809,7 +805,7 @@
           <p:cNvPr id="3" name="Inhaltsplatzhalter 2">
             <a:extLst>
               <a:ext uri="{FF2B5EF4-FFF2-40B4-BE49-F238E27FC236}">
-                <a16:creationId xmlns:a16="http://schemas.microsoft.com/office/drawing/2014/main" xmlns="" id="{7474C58B-1CEA-4A17-BD20-B466F1034F87}"/>
+                <a16:creationId xmlns:a16="http://schemas.microsoft.com/office/drawing/2014/main" id="{7474C58B-1CEA-4A17-BD20-B466F1034F87}"/>
               </a:ext>
             </a:extLst>
           </p:cNvPr>
@@ -866,7 +862,7 @@
           <p:cNvPr id="4" name="Datumsplatzhalter 3">
             <a:extLst>
               <a:ext uri="{FF2B5EF4-FFF2-40B4-BE49-F238E27FC236}">
-                <a16:creationId xmlns:a16="http://schemas.microsoft.com/office/drawing/2014/main" xmlns="" id="{DAD5F4C1-D828-4ECF-8EF0-E8DB2E8155CA}"/>
+                <a16:creationId xmlns:a16="http://schemas.microsoft.com/office/drawing/2014/main" id="{DAD5F4C1-D828-4ECF-8EF0-E8DB2E8155CA}"/>
               </a:ext>
             </a:extLst>
           </p:cNvPr>
@@ -885,7 +881,7 @@
             <a:fld id="{EF2A35CB-578F-4832-A0CE-F029506BB1A4}" type="datetimeFigureOut">
               <a:rPr lang="de-DE" smtClean="0"/>
               <a:pPr/>
-              <a:t>13.08.2017</a:t>
+              <a:t>28.02.18</a:t>
             </a:fld>
             <a:endParaRPr lang="de-DE"/>
           </a:p>
@@ -896,7 +892,7 @@
           <p:cNvPr id="5" name="Fußzeilenplatzhalter 4">
             <a:extLst>
               <a:ext uri="{FF2B5EF4-FFF2-40B4-BE49-F238E27FC236}">
-                <a16:creationId xmlns:a16="http://schemas.microsoft.com/office/drawing/2014/main" xmlns="" id="{F12AEEF2-0863-4502-B072-749D90B14617}"/>
+                <a16:creationId xmlns:a16="http://schemas.microsoft.com/office/drawing/2014/main" id="{F12AEEF2-0863-4502-B072-749D90B14617}"/>
               </a:ext>
             </a:extLst>
           </p:cNvPr>
@@ -921,7 +917,7 @@
           <p:cNvPr id="6" name="Foliennummernplatzhalter 5">
             <a:extLst>
               <a:ext uri="{FF2B5EF4-FFF2-40B4-BE49-F238E27FC236}">
-                <a16:creationId xmlns:a16="http://schemas.microsoft.com/office/drawing/2014/main" xmlns="" id="{830AEF98-E80E-4C64-A1B6-DD924CFF3AB5}"/>
+                <a16:creationId xmlns:a16="http://schemas.microsoft.com/office/drawing/2014/main" id="{830AEF98-E80E-4C64-A1B6-DD924CFF3AB5}"/>
               </a:ext>
             </a:extLst>
           </p:cNvPr>
@@ -940,7 +936,7 @@
             <a:fld id="{C3CA5D77-34DE-49AF-8B1F-A6673D6EB223}" type="slidenum">
               <a:rPr lang="de-DE" smtClean="0"/>
               <a:pPr/>
-              <a:t>‹Nr.›</a:t>
+              <a:t>‹#›</a:t>
             </a:fld>
             <a:endParaRPr lang="de-DE"/>
           </a:p>
@@ -949,7 +945,7 @@
     </p:spTree>
     <p:extLst>
       <p:ext uri="{BB962C8B-B14F-4D97-AF65-F5344CB8AC3E}">
-        <p14:creationId xmlns:p14="http://schemas.microsoft.com/office/powerpoint/2010/main" xmlns="" val="4074857526"/>
+        <p14:creationId xmlns:p14="http://schemas.microsoft.com/office/powerpoint/2010/main" val="4074857526"/>
       </p:ext>
     </p:extLst>
   </p:cSld>
@@ -981,7 +977,7 @@
           <p:cNvPr id="2" name="Titel 1">
             <a:extLst>
               <a:ext uri="{FF2B5EF4-FFF2-40B4-BE49-F238E27FC236}">
-                <a16:creationId xmlns:a16="http://schemas.microsoft.com/office/drawing/2014/main" xmlns="" id="{23E1A649-007B-48A6-9C97-32AFE7CBF7A5}"/>
+                <a16:creationId xmlns:a16="http://schemas.microsoft.com/office/drawing/2014/main" id="{23E1A649-007B-48A6-9C97-32AFE7CBF7A5}"/>
               </a:ext>
             </a:extLst>
           </p:cNvPr>
@@ -1018,7 +1014,7 @@
           <p:cNvPr id="3" name="Textplatzhalter 2">
             <a:extLst>
               <a:ext uri="{FF2B5EF4-FFF2-40B4-BE49-F238E27FC236}">
-                <a16:creationId xmlns:a16="http://schemas.microsoft.com/office/drawing/2014/main" xmlns="" id="{FD2B946F-BEF5-4AD1-8805-C1CEB3FDD58B}"/>
+                <a16:creationId xmlns:a16="http://schemas.microsoft.com/office/drawing/2014/main" id="{FD2B946F-BEF5-4AD1-8805-C1CEB3FDD58B}"/>
               </a:ext>
             </a:extLst>
           </p:cNvPr>
@@ -1143,7 +1139,7 @@
           <p:cNvPr id="4" name="Datumsplatzhalter 3">
             <a:extLst>
               <a:ext uri="{FF2B5EF4-FFF2-40B4-BE49-F238E27FC236}">
-                <a16:creationId xmlns:a16="http://schemas.microsoft.com/office/drawing/2014/main" xmlns="" id="{D46E7B25-8139-4329-803F-1A81A8E77226}"/>
+                <a16:creationId xmlns:a16="http://schemas.microsoft.com/office/drawing/2014/main" id="{D46E7B25-8139-4329-803F-1A81A8E77226}"/>
               </a:ext>
             </a:extLst>
           </p:cNvPr>
@@ -1162,7 +1158,7 @@
             <a:fld id="{EF2A35CB-578F-4832-A0CE-F029506BB1A4}" type="datetimeFigureOut">
               <a:rPr lang="de-DE" smtClean="0"/>
               <a:pPr/>
-              <a:t>13.08.2017</a:t>
+              <a:t>28.02.18</a:t>
             </a:fld>
             <a:endParaRPr lang="de-DE"/>
           </a:p>
@@ -1173,7 +1169,7 @@
           <p:cNvPr id="5" name="Fußzeilenplatzhalter 4">
             <a:extLst>
               <a:ext uri="{FF2B5EF4-FFF2-40B4-BE49-F238E27FC236}">
-                <a16:creationId xmlns:a16="http://schemas.microsoft.com/office/drawing/2014/main" xmlns="" id="{2D1313A3-2F65-4CB5-B97E-2E54145D474E}"/>
+                <a16:creationId xmlns:a16="http://schemas.microsoft.com/office/drawing/2014/main" id="{2D1313A3-2F65-4CB5-B97E-2E54145D474E}"/>
               </a:ext>
             </a:extLst>
           </p:cNvPr>
@@ -1198,7 +1194,7 @@
           <p:cNvPr id="6" name="Foliennummernplatzhalter 5">
             <a:extLst>
               <a:ext uri="{FF2B5EF4-FFF2-40B4-BE49-F238E27FC236}">
-                <a16:creationId xmlns:a16="http://schemas.microsoft.com/office/drawing/2014/main" xmlns="" id="{5BE05D2B-48A3-4EC9-BCF4-2A514450E17A}"/>
+                <a16:creationId xmlns:a16="http://schemas.microsoft.com/office/drawing/2014/main" id="{5BE05D2B-48A3-4EC9-BCF4-2A514450E17A}"/>
               </a:ext>
             </a:extLst>
           </p:cNvPr>
@@ -1217,7 +1213,7 @@
             <a:fld id="{C3CA5D77-34DE-49AF-8B1F-A6673D6EB223}" type="slidenum">
               <a:rPr lang="de-DE" smtClean="0"/>
               <a:pPr/>
-              <a:t>‹Nr.›</a:t>
+              <a:t>‹#›</a:t>
             </a:fld>
             <a:endParaRPr lang="de-DE"/>
           </a:p>
@@ -1226,7 +1222,7 @@
     </p:spTree>
     <p:extLst>
       <p:ext uri="{BB962C8B-B14F-4D97-AF65-F5344CB8AC3E}">
-        <p14:creationId xmlns:p14="http://schemas.microsoft.com/office/powerpoint/2010/main" xmlns="" val="2303264781"/>
+        <p14:creationId xmlns:p14="http://schemas.microsoft.com/office/powerpoint/2010/main" val="2303264781"/>
       </p:ext>
     </p:extLst>
   </p:cSld>
@@ -1258,7 +1254,7 @@
           <p:cNvPr id="2" name="Titel 1">
             <a:extLst>
               <a:ext uri="{FF2B5EF4-FFF2-40B4-BE49-F238E27FC236}">
-                <a16:creationId xmlns:a16="http://schemas.microsoft.com/office/drawing/2014/main" xmlns="" id="{4F547363-DB02-4F94-9FBB-82F7B81EC739}"/>
+                <a16:creationId xmlns:a16="http://schemas.microsoft.com/office/drawing/2014/main" id="{4F547363-DB02-4F94-9FBB-82F7B81EC739}"/>
               </a:ext>
             </a:extLst>
           </p:cNvPr>
@@ -1286,7 +1282,7 @@
           <p:cNvPr id="3" name="Inhaltsplatzhalter 2">
             <a:extLst>
               <a:ext uri="{FF2B5EF4-FFF2-40B4-BE49-F238E27FC236}">
-                <a16:creationId xmlns:a16="http://schemas.microsoft.com/office/drawing/2014/main" xmlns="" id="{8269455B-758A-438B-8F70-AFFC2A0EF558}"/>
+                <a16:creationId xmlns:a16="http://schemas.microsoft.com/office/drawing/2014/main" id="{8269455B-758A-438B-8F70-AFFC2A0EF558}"/>
               </a:ext>
             </a:extLst>
           </p:cNvPr>
@@ -1348,7 +1344,7 @@
           <p:cNvPr id="4" name="Inhaltsplatzhalter 3">
             <a:extLst>
               <a:ext uri="{FF2B5EF4-FFF2-40B4-BE49-F238E27FC236}">
-                <a16:creationId xmlns:a16="http://schemas.microsoft.com/office/drawing/2014/main" xmlns="" id="{F4D96B40-DC81-4D8A-850B-3213481D9D68}"/>
+                <a16:creationId xmlns:a16="http://schemas.microsoft.com/office/drawing/2014/main" id="{F4D96B40-DC81-4D8A-850B-3213481D9D68}"/>
               </a:ext>
             </a:extLst>
           </p:cNvPr>
@@ -1410,7 +1406,7 @@
           <p:cNvPr id="5" name="Datumsplatzhalter 4">
             <a:extLst>
               <a:ext uri="{FF2B5EF4-FFF2-40B4-BE49-F238E27FC236}">
-                <a16:creationId xmlns:a16="http://schemas.microsoft.com/office/drawing/2014/main" xmlns="" id="{7659CD72-C9B6-4761-BE22-EB682960CC9E}"/>
+                <a16:creationId xmlns:a16="http://schemas.microsoft.com/office/drawing/2014/main" id="{7659CD72-C9B6-4761-BE22-EB682960CC9E}"/>
               </a:ext>
             </a:extLst>
           </p:cNvPr>
@@ -1429,7 +1425,7 @@
             <a:fld id="{EF2A35CB-578F-4832-A0CE-F029506BB1A4}" type="datetimeFigureOut">
               <a:rPr lang="de-DE" smtClean="0"/>
               <a:pPr/>
-              <a:t>13.08.2017</a:t>
+              <a:t>28.02.18</a:t>
             </a:fld>
             <a:endParaRPr lang="de-DE"/>
           </a:p>
@@ -1440,7 +1436,7 @@
           <p:cNvPr id="6" name="Fußzeilenplatzhalter 5">
             <a:extLst>
               <a:ext uri="{FF2B5EF4-FFF2-40B4-BE49-F238E27FC236}">
-                <a16:creationId xmlns:a16="http://schemas.microsoft.com/office/drawing/2014/main" xmlns="" id="{D91D7930-AE8D-4BCC-8EAE-80CF18E54CAF}"/>
+                <a16:creationId xmlns:a16="http://schemas.microsoft.com/office/drawing/2014/main" id="{D91D7930-AE8D-4BCC-8EAE-80CF18E54CAF}"/>
               </a:ext>
             </a:extLst>
           </p:cNvPr>
@@ -1465,7 +1461,7 @@
           <p:cNvPr id="7" name="Foliennummernplatzhalter 6">
             <a:extLst>
               <a:ext uri="{FF2B5EF4-FFF2-40B4-BE49-F238E27FC236}">
-                <a16:creationId xmlns:a16="http://schemas.microsoft.com/office/drawing/2014/main" xmlns="" id="{6327470F-03EA-4A4E-BBCA-E56AA81DF097}"/>
+                <a16:creationId xmlns:a16="http://schemas.microsoft.com/office/drawing/2014/main" id="{6327470F-03EA-4A4E-BBCA-E56AA81DF097}"/>
               </a:ext>
             </a:extLst>
           </p:cNvPr>
@@ -1484,7 +1480,7 @@
             <a:fld id="{C3CA5D77-34DE-49AF-8B1F-A6673D6EB223}" type="slidenum">
               <a:rPr lang="de-DE" smtClean="0"/>
               <a:pPr/>
-              <a:t>‹Nr.›</a:t>
+              <a:t>‹#›</a:t>
             </a:fld>
             <a:endParaRPr lang="de-DE"/>
           </a:p>
@@ -1493,7 +1489,7 @@
     </p:spTree>
     <p:extLst>
       <p:ext uri="{BB962C8B-B14F-4D97-AF65-F5344CB8AC3E}">
-        <p14:creationId xmlns:p14="http://schemas.microsoft.com/office/powerpoint/2010/main" xmlns="" val="693695377"/>
+        <p14:creationId xmlns:p14="http://schemas.microsoft.com/office/powerpoint/2010/main" val="693695377"/>
       </p:ext>
     </p:extLst>
   </p:cSld>
@@ -1525,7 +1521,7 @@
           <p:cNvPr id="2" name="Titel 1">
             <a:extLst>
               <a:ext uri="{FF2B5EF4-FFF2-40B4-BE49-F238E27FC236}">
-                <a16:creationId xmlns:a16="http://schemas.microsoft.com/office/drawing/2014/main" xmlns="" id="{5A3ACA71-08B9-4828-9B35-1D6986882027}"/>
+                <a16:creationId xmlns:a16="http://schemas.microsoft.com/office/drawing/2014/main" id="{5A3ACA71-08B9-4828-9B35-1D6986882027}"/>
               </a:ext>
             </a:extLst>
           </p:cNvPr>
@@ -1558,7 +1554,7 @@
           <p:cNvPr id="3" name="Textplatzhalter 2">
             <a:extLst>
               <a:ext uri="{FF2B5EF4-FFF2-40B4-BE49-F238E27FC236}">
-                <a16:creationId xmlns:a16="http://schemas.microsoft.com/office/drawing/2014/main" xmlns="" id="{9F4D0643-1FAC-45A0-ADE6-AD037634A0CA}"/>
+                <a16:creationId xmlns:a16="http://schemas.microsoft.com/office/drawing/2014/main" id="{9F4D0643-1FAC-45A0-ADE6-AD037634A0CA}"/>
               </a:ext>
             </a:extLst>
           </p:cNvPr>
@@ -1629,7 +1625,7 @@
           <p:cNvPr id="4" name="Inhaltsplatzhalter 3">
             <a:extLst>
               <a:ext uri="{FF2B5EF4-FFF2-40B4-BE49-F238E27FC236}">
-                <a16:creationId xmlns:a16="http://schemas.microsoft.com/office/drawing/2014/main" xmlns="" id="{F4751B6E-361A-483F-B6B5-C08E78F20A39}"/>
+                <a16:creationId xmlns:a16="http://schemas.microsoft.com/office/drawing/2014/main" id="{F4751B6E-361A-483F-B6B5-C08E78F20A39}"/>
               </a:ext>
             </a:extLst>
           </p:cNvPr>
@@ -1691,7 +1687,7 @@
           <p:cNvPr id="5" name="Textplatzhalter 4">
             <a:extLst>
               <a:ext uri="{FF2B5EF4-FFF2-40B4-BE49-F238E27FC236}">
-                <a16:creationId xmlns:a16="http://schemas.microsoft.com/office/drawing/2014/main" xmlns="" id="{81E7E7FF-3AF1-4237-8C1D-3C20141DC142}"/>
+                <a16:creationId xmlns:a16="http://schemas.microsoft.com/office/drawing/2014/main" id="{81E7E7FF-3AF1-4237-8C1D-3C20141DC142}"/>
               </a:ext>
             </a:extLst>
           </p:cNvPr>
@@ -1762,7 +1758,7 @@
           <p:cNvPr id="6" name="Inhaltsplatzhalter 5">
             <a:extLst>
               <a:ext uri="{FF2B5EF4-FFF2-40B4-BE49-F238E27FC236}">
-                <a16:creationId xmlns:a16="http://schemas.microsoft.com/office/drawing/2014/main" xmlns="" id="{117DB737-EE99-4F27-AC5B-BF47933947BB}"/>
+                <a16:creationId xmlns:a16="http://schemas.microsoft.com/office/drawing/2014/main" id="{117DB737-EE99-4F27-AC5B-BF47933947BB}"/>
               </a:ext>
             </a:extLst>
           </p:cNvPr>
@@ -1824,7 +1820,7 @@
           <p:cNvPr id="7" name="Datumsplatzhalter 6">
             <a:extLst>
               <a:ext uri="{FF2B5EF4-FFF2-40B4-BE49-F238E27FC236}">
-                <a16:creationId xmlns:a16="http://schemas.microsoft.com/office/drawing/2014/main" xmlns="" id="{86C19129-FCF5-4E2F-892C-FBFCBDAE490B}"/>
+                <a16:creationId xmlns:a16="http://schemas.microsoft.com/office/drawing/2014/main" id="{86C19129-FCF5-4E2F-892C-FBFCBDAE490B}"/>
               </a:ext>
             </a:extLst>
           </p:cNvPr>
@@ -1843,7 +1839,7 @@
             <a:fld id="{EF2A35CB-578F-4832-A0CE-F029506BB1A4}" type="datetimeFigureOut">
               <a:rPr lang="de-DE" smtClean="0"/>
               <a:pPr/>
-              <a:t>13.08.2017</a:t>
+              <a:t>28.02.18</a:t>
             </a:fld>
             <a:endParaRPr lang="de-DE"/>
           </a:p>
@@ -1854,7 +1850,7 @@
           <p:cNvPr id="8" name="Fußzeilenplatzhalter 7">
             <a:extLst>
               <a:ext uri="{FF2B5EF4-FFF2-40B4-BE49-F238E27FC236}">
-                <a16:creationId xmlns:a16="http://schemas.microsoft.com/office/drawing/2014/main" xmlns="" id="{1B533554-5504-4D21-BCC5-4F7468A76AB7}"/>
+                <a16:creationId xmlns:a16="http://schemas.microsoft.com/office/drawing/2014/main" id="{1B533554-5504-4D21-BCC5-4F7468A76AB7}"/>
               </a:ext>
             </a:extLst>
           </p:cNvPr>
@@ -1879,7 +1875,7 @@
           <p:cNvPr id="9" name="Foliennummernplatzhalter 8">
             <a:extLst>
               <a:ext uri="{FF2B5EF4-FFF2-40B4-BE49-F238E27FC236}">
-                <a16:creationId xmlns:a16="http://schemas.microsoft.com/office/drawing/2014/main" xmlns="" id="{7F000F6B-F2BA-481A-AF99-BF7CADB8FFD1}"/>
+                <a16:creationId xmlns:a16="http://schemas.microsoft.com/office/drawing/2014/main" id="{7F000F6B-F2BA-481A-AF99-BF7CADB8FFD1}"/>
               </a:ext>
             </a:extLst>
           </p:cNvPr>
@@ -1898,7 +1894,7 @@
             <a:fld id="{C3CA5D77-34DE-49AF-8B1F-A6673D6EB223}" type="slidenum">
               <a:rPr lang="de-DE" smtClean="0"/>
               <a:pPr/>
-              <a:t>‹Nr.›</a:t>
+              <a:t>‹#›</a:t>
             </a:fld>
             <a:endParaRPr lang="de-DE"/>
           </a:p>
@@ -1907,7 +1903,7 @@
     </p:spTree>
     <p:extLst>
       <p:ext uri="{BB962C8B-B14F-4D97-AF65-F5344CB8AC3E}">
-        <p14:creationId xmlns:p14="http://schemas.microsoft.com/office/powerpoint/2010/main" xmlns="" val="3233572927"/>
+        <p14:creationId xmlns:p14="http://schemas.microsoft.com/office/powerpoint/2010/main" val="3233572927"/>
       </p:ext>
     </p:extLst>
   </p:cSld>
@@ -1939,7 +1935,7 @@
           <p:cNvPr id="2" name="Titel 1">
             <a:extLst>
               <a:ext uri="{FF2B5EF4-FFF2-40B4-BE49-F238E27FC236}">
-                <a16:creationId xmlns:a16="http://schemas.microsoft.com/office/drawing/2014/main" xmlns="" id="{208D81A9-A6EA-41ED-BA77-99DBFD2C54F4}"/>
+                <a16:creationId xmlns:a16="http://schemas.microsoft.com/office/drawing/2014/main" id="{208D81A9-A6EA-41ED-BA77-99DBFD2C54F4}"/>
               </a:ext>
             </a:extLst>
           </p:cNvPr>
@@ -1967,7 +1963,7 @@
           <p:cNvPr id="3" name="Datumsplatzhalter 2">
             <a:extLst>
               <a:ext uri="{FF2B5EF4-FFF2-40B4-BE49-F238E27FC236}">
-                <a16:creationId xmlns:a16="http://schemas.microsoft.com/office/drawing/2014/main" xmlns="" id="{31E4E9ED-C254-4357-9E4A-CDC7B9A5A077}"/>
+                <a16:creationId xmlns:a16="http://schemas.microsoft.com/office/drawing/2014/main" id="{31E4E9ED-C254-4357-9E4A-CDC7B9A5A077}"/>
               </a:ext>
             </a:extLst>
           </p:cNvPr>
@@ -1986,7 +1982,7 @@
             <a:fld id="{EF2A35CB-578F-4832-A0CE-F029506BB1A4}" type="datetimeFigureOut">
               <a:rPr lang="de-DE" smtClean="0"/>
               <a:pPr/>
-              <a:t>13.08.2017</a:t>
+              <a:t>28.02.18</a:t>
             </a:fld>
             <a:endParaRPr lang="de-DE"/>
           </a:p>
@@ -1997,7 +1993,7 @@
           <p:cNvPr id="4" name="Fußzeilenplatzhalter 3">
             <a:extLst>
               <a:ext uri="{FF2B5EF4-FFF2-40B4-BE49-F238E27FC236}">
-                <a16:creationId xmlns:a16="http://schemas.microsoft.com/office/drawing/2014/main" xmlns="" id="{1AE8D34C-F721-4DB1-8296-575C4CBE8657}"/>
+                <a16:creationId xmlns:a16="http://schemas.microsoft.com/office/drawing/2014/main" id="{1AE8D34C-F721-4DB1-8296-575C4CBE8657}"/>
               </a:ext>
             </a:extLst>
           </p:cNvPr>
@@ -2022,7 +2018,7 @@
           <p:cNvPr id="5" name="Foliennummernplatzhalter 4">
             <a:extLst>
               <a:ext uri="{FF2B5EF4-FFF2-40B4-BE49-F238E27FC236}">
-                <a16:creationId xmlns:a16="http://schemas.microsoft.com/office/drawing/2014/main" xmlns="" id="{EFF6F66C-E57A-444E-8CD4-7DE5B76D8A85}"/>
+                <a16:creationId xmlns:a16="http://schemas.microsoft.com/office/drawing/2014/main" id="{EFF6F66C-E57A-444E-8CD4-7DE5B76D8A85}"/>
               </a:ext>
             </a:extLst>
           </p:cNvPr>
@@ -2041,7 +2037,7 @@
             <a:fld id="{C3CA5D77-34DE-49AF-8B1F-A6673D6EB223}" type="slidenum">
               <a:rPr lang="de-DE" smtClean="0"/>
               <a:pPr/>
-              <a:t>‹Nr.›</a:t>
+              <a:t>‹#›</a:t>
             </a:fld>
             <a:endParaRPr lang="de-DE"/>
           </a:p>
@@ -2050,7 +2046,7 @@
     </p:spTree>
     <p:extLst>
       <p:ext uri="{BB962C8B-B14F-4D97-AF65-F5344CB8AC3E}">
-        <p14:creationId xmlns:p14="http://schemas.microsoft.com/office/powerpoint/2010/main" xmlns="" val="763056722"/>
+        <p14:creationId xmlns:p14="http://schemas.microsoft.com/office/powerpoint/2010/main" val="763056722"/>
       </p:ext>
     </p:extLst>
   </p:cSld>
@@ -2082,7 +2078,7 @@
           <p:cNvPr id="2" name="Datumsplatzhalter 1">
             <a:extLst>
               <a:ext uri="{FF2B5EF4-FFF2-40B4-BE49-F238E27FC236}">
-                <a16:creationId xmlns:a16="http://schemas.microsoft.com/office/drawing/2014/main" xmlns="" id="{DD80158F-C60B-4DC3-B468-F9C97DD8D0CA}"/>
+                <a16:creationId xmlns:a16="http://schemas.microsoft.com/office/drawing/2014/main" id="{DD80158F-C60B-4DC3-B468-F9C97DD8D0CA}"/>
               </a:ext>
             </a:extLst>
           </p:cNvPr>
@@ -2101,7 +2097,7 @@
             <a:fld id="{EF2A35CB-578F-4832-A0CE-F029506BB1A4}" type="datetimeFigureOut">
               <a:rPr lang="de-DE" smtClean="0"/>
               <a:pPr/>
-              <a:t>13.08.2017</a:t>
+              <a:t>28.02.18</a:t>
             </a:fld>
             <a:endParaRPr lang="de-DE"/>
           </a:p>
@@ -2112,7 +2108,7 @@
           <p:cNvPr id="3" name="Fußzeilenplatzhalter 2">
             <a:extLst>
               <a:ext uri="{FF2B5EF4-FFF2-40B4-BE49-F238E27FC236}">
-                <a16:creationId xmlns:a16="http://schemas.microsoft.com/office/drawing/2014/main" xmlns="" id="{798218CE-F16F-4448-9368-0DB15EB5ABDF}"/>
+                <a16:creationId xmlns:a16="http://schemas.microsoft.com/office/drawing/2014/main" id="{798218CE-F16F-4448-9368-0DB15EB5ABDF}"/>
               </a:ext>
             </a:extLst>
           </p:cNvPr>
@@ -2137,7 +2133,7 @@
           <p:cNvPr id="4" name="Foliennummernplatzhalter 3">
             <a:extLst>
               <a:ext uri="{FF2B5EF4-FFF2-40B4-BE49-F238E27FC236}">
-                <a16:creationId xmlns:a16="http://schemas.microsoft.com/office/drawing/2014/main" xmlns="" id="{F7F0AC90-447D-4D5E-9AA5-ED2F571ECF1D}"/>
+                <a16:creationId xmlns:a16="http://schemas.microsoft.com/office/drawing/2014/main" id="{F7F0AC90-447D-4D5E-9AA5-ED2F571ECF1D}"/>
               </a:ext>
             </a:extLst>
           </p:cNvPr>
@@ -2156,7 +2152,7 @@
             <a:fld id="{C3CA5D77-34DE-49AF-8B1F-A6673D6EB223}" type="slidenum">
               <a:rPr lang="de-DE" smtClean="0"/>
               <a:pPr/>
-              <a:t>‹Nr.›</a:t>
+              <a:t>‹#›</a:t>
             </a:fld>
             <a:endParaRPr lang="de-DE"/>
           </a:p>
@@ -2165,7 +2161,7 @@
     </p:spTree>
     <p:extLst>
       <p:ext uri="{BB962C8B-B14F-4D97-AF65-F5344CB8AC3E}">
-        <p14:creationId xmlns:p14="http://schemas.microsoft.com/office/powerpoint/2010/main" xmlns="" val="1473046818"/>
+        <p14:creationId xmlns:p14="http://schemas.microsoft.com/office/powerpoint/2010/main" val="1473046818"/>
       </p:ext>
     </p:extLst>
   </p:cSld>
@@ -2197,7 +2193,7 @@
           <p:cNvPr id="2" name="Titel 1">
             <a:extLst>
               <a:ext uri="{FF2B5EF4-FFF2-40B4-BE49-F238E27FC236}">
-                <a16:creationId xmlns:a16="http://schemas.microsoft.com/office/drawing/2014/main" xmlns="" id="{6FD0C693-D457-4B0B-918E-BF2A9D0A8C6F}"/>
+                <a16:creationId xmlns:a16="http://schemas.microsoft.com/office/drawing/2014/main" id="{6FD0C693-D457-4B0B-918E-BF2A9D0A8C6F}"/>
               </a:ext>
             </a:extLst>
           </p:cNvPr>
@@ -2234,7 +2230,7 @@
           <p:cNvPr id="3" name="Inhaltsplatzhalter 2">
             <a:extLst>
               <a:ext uri="{FF2B5EF4-FFF2-40B4-BE49-F238E27FC236}">
-                <a16:creationId xmlns:a16="http://schemas.microsoft.com/office/drawing/2014/main" xmlns="" id="{E4A7DE1D-0715-4842-A2BE-B908120D382D}"/>
+                <a16:creationId xmlns:a16="http://schemas.microsoft.com/office/drawing/2014/main" id="{E4A7DE1D-0715-4842-A2BE-B908120D382D}"/>
               </a:ext>
             </a:extLst>
           </p:cNvPr>
@@ -2324,7 +2320,7 @@
           <p:cNvPr id="4" name="Textplatzhalter 3">
             <a:extLst>
               <a:ext uri="{FF2B5EF4-FFF2-40B4-BE49-F238E27FC236}">
-                <a16:creationId xmlns:a16="http://schemas.microsoft.com/office/drawing/2014/main" xmlns="" id="{8DF98D07-9297-47E8-B6F3-C3416BE94F95}"/>
+                <a16:creationId xmlns:a16="http://schemas.microsoft.com/office/drawing/2014/main" id="{8DF98D07-9297-47E8-B6F3-C3416BE94F95}"/>
               </a:ext>
             </a:extLst>
           </p:cNvPr>
@@ -2395,7 +2391,7 @@
           <p:cNvPr id="5" name="Datumsplatzhalter 4">
             <a:extLst>
               <a:ext uri="{FF2B5EF4-FFF2-40B4-BE49-F238E27FC236}">
-                <a16:creationId xmlns:a16="http://schemas.microsoft.com/office/drawing/2014/main" xmlns="" id="{3B51527E-698D-4E13-8F95-038F2709B7F6}"/>
+                <a16:creationId xmlns:a16="http://schemas.microsoft.com/office/drawing/2014/main" id="{3B51527E-698D-4E13-8F95-038F2709B7F6}"/>
               </a:ext>
             </a:extLst>
           </p:cNvPr>
@@ -2414,7 +2410,7 @@
             <a:fld id="{EF2A35CB-578F-4832-A0CE-F029506BB1A4}" type="datetimeFigureOut">
               <a:rPr lang="de-DE" smtClean="0"/>
               <a:pPr/>
-              <a:t>13.08.2017</a:t>
+              <a:t>28.02.18</a:t>
             </a:fld>
             <a:endParaRPr lang="de-DE"/>
           </a:p>
@@ -2425,7 +2421,7 @@
           <p:cNvPr id="6" name="Fußzeilenplatzhalter 5">
             <a:extLst>
               <a:ext uri="{FF2B5EF4-FFF2-40B4-BE49-F238E27FC236}">
-                <a16:creationId xmlns:a16="http://schemas.microsoft.com/office/drawing/2014/main" xmlns="" id="{6EC997FD-EAEA-494C-994E-3E7FCDC52F0F}"/>
+                <a16:creationId xmlns:a16="http://schemas.microsoft.com/office/drawing/2014/main" id="{6EC997FD-EAEA-494C-994E-3E7FCDC52F0F}"/>
               </a:ext>
             </a:extLst>
           </p:cNvPr>
@@ -2450,7 +2446,7 @@
           <p:cNvPr id="7" name="Foliennummernplatzhalter 6">
             <a:extLst>
               <a:ext uri="{FF2B5EF4-FFF2-40B4-BE49-F238E27FC236}">
-                <a16:creationId xmlns:a16="http://schemas.microsoft.com/office/drawing/2014/main" xmlns="" id="{4678BBF6-294E-4750-8F60-0FCA928D7467}"/>
+                <a16:creationId xmlns:a16="http://schemas.microsoft.com/office/drawing/2014/main" id="{4678BBF6-294E-4750-8F60-0FCA928D7467}"/>
               </a:ext>
             </a:extLst>
           </p:cNvPr>
@@ -2469,7 +2465,7 @@
             <a:fld id="{C3CA5D77-34DE-49AF-8B1F-A6673D6EB223}" type="slidenum">
               <a:rPr lang="de-DE" smtClean="0"/>
               <a:pPr/>
-              <a:t>‹Nr.›</a:t>
+              <a:t>‹#›</a:t>
             </a:fld>
             <a:endParaRPr lang="de-DE"/>
           </a:p>
@@ -2478,7 +2474,7 @@
     </p:spTree>
     <p:extLst>
       <p:ext uri="{BB962C8B-B14F-4D97-AF65-F5344CB8AC3E}">
-        <p14:creationId xmlns:p14="http://schemas.microsoft.com/office/powerpoint/2010/main" xmlns="" val="2112745611"/>
+        <p14:creationId xmlns:p14="http://schemas.microsoft.com/office/powerpoint/2010/main" val="2112745611"/>
       </p:ext>
     </p:extLst>
   </p:cSld>
@@ -2510,7 +2506,7 @@
           <p:cNvPr id="2" name="Titel 1">
             <a:extLst>
               <a:ext uri="{FF2B5EF4-FFF2-40B4-BE49-F238E27FC236}">
-                <a16:creationId xmlns:a16="http://schemas.microsoft.com/office/drawing/2014/main" xmlns="" id="{175F12FB-D4FC-4B46-A177-E93C4E3BA1D9}"/>
+                <a16:creationId xmlns:a16="http://schemas.microsoft.com/office/drawing/2014/main" id="{175F12FB-D4FC-4B46-A177-E93C4E3BA1D9}"/>
               </a:ext>
             </a:extLst>
           </p:cNvPr>
@@ -2547,7 +2543,7 @@
           <p:cNvPr id="3" name="Bildplatzhalter 2">
             <a:extLst>
               <a:ext uri="{FF2B5EF4-FFF2-40B4-BE49-F238E27FC236}">
-                <a16:creationId xmlns:a16="http://schemas.microsoft.com/office/drawing/2014/main" xmlns="" id="{6D589EBE-543A-4149-ADFC-203B4EE82AFC}"/>
+                <a16:creationId xmlns:a16="http://schemas.microsoft.com/office/drawing/2014/main" id="{6D589EBE-543A-4149-ADFC-203B4EE82AFC}"/>
               </a:ext>
             </a:extLst>
           </p:cNvPr>
@@ -2614,7 +2610,7 @@
           <p:cNvPr id="4" name="Textplatzhalter 3">
             <a:extLst>
               <a:ext uri="{FF2B5EF4-FFF2-40B4-BE49-F238E27FC236}">
-                <a16:creationId xmlns:a16="http://schemas.microsoft.com/office/drawing/2014/main" xmlns="" id="{777F2890-83FF-4A79-BB9D-D86BE34E31F3}"/>
+                <a16:creationId xmlns:a16="http://schemas.microsoft.com/office/drawing/2014/main" id="{777F2890-83FF-4A79-BB9D-D86BE34E31F3}"/>
               </a:ext>
             </a:extLst>
           </p:cNvPr>
@@ -2685,7 +2681,7 @@
           <p:cNvPr id="5" name="Datumsplatzhalter 4">
             <a:extLst>
               <a:ext uri="{FF2B5EF4-FFF2-40B4-BE49-F238E27FC236}">
-                <a16:creationId xmlns:a16="http://schemas.microsoft.com/office/drawing/2014/main" xmlns="" id="{BD134A0A-5C30-4074-99F0-8D0B3636DFDB}"/>
+                <a16:creationId xmlns:a16="http://schemas.microsoft.com/office/drawing/2014/main" id="{BD134A0A-5C30-4074-99F0-8D0B3636DFDB}"/>
               </a:ext>
             </a:extLst>
           </p:cNvPr>
@@ -2704,7 +2700,7 @@
             <a:fld id="{EF2A35CB-578F-4832-A0CE-F029506BB1A4}" type="datetimeFigureOut">
               <a:rPr lang="de-DE" smtClean="0"/>
               <a:pPr/>
-              <a:t>13.08.2017</a:t>
+              <a:t>28.02.18</a:t>
             </a:fld>
             <a:endParaRPr lang="de-DE"/>
           </a:p>
@@ -2715,7 +2711,7 @@
           <p:cNvPr id="6" name="Fußzeilenplatzhalter 5">
             <a:extLst>
               <a:ext uri="{FF2B5EF4-FFF2-40B4-BE49-F238E27FC236}">
-                <a16:creationId xmlns:a16="http://schemas.microsoft.com/office/drawing/2014/main" xmlns="" id="{F8EFB62A-286B-4918-8683-1E4258C652CF}"/>
+                <a16:creationId xmlns:a16="http://schemas.microsoft.com/office/drawing/2014/main" id="{F8EFB62A-286B-4918-8683-1E4258C652CF}"/>
               </a:ext>
             </a:extLst>
           </p:cNvPr>
@@ -2740,7 +2736,7 @@
           <p:cNvPr id="7" name="Foliennummernplatzhalter 6">
             <a:extLst>
               <a:ext uri="{FF2B5EF4-FFF2-40B4-BE49-F238E27FC236}">
-                <a16:creationId xmlns:a16="http://schemas.microsoft.com/office/drawing/2014/main" xmlns="" id="{289E9439-63CD-4990-A188-E475D4F9A369}"/>
+                <a16:creationId xmlns:a16="http://schemas.microsoft.com/office/drawing/2014/main" id="{289E9439-63CD-4990-A188-E475D4F9A369}"/>
               </a:ext>
             </a:extLst>
           </p:cNvPr>
@@ -2759,7 +2755,7 @@
             <a:fld id="{C3CA5D77-34DE-49AF-8B1F-A6673D6EB223}" type="slidenum">
               <a:rPr lang="de-DE" smtClean="0"/>
               <a:pPr/>
-              <a:t>‹Nr.›</a:t>
+              <a:t>‹#›</a:t>
             </a:fld>
             <a:endParaRPr lang="de-DE"/>
           </a:p>
@@ -2768,7 +2764,7 @@
     </p:spTree>
     <p:extLst>
       <p:ext uri="{BB962C8B-B14F-4D97-AF65-F5344CB8AC3E}">
-        <p14:creationId xmlns:p14="http://schemas.microsoft.com/office/powerpoint/2010/main" xmlns="" val="3237519049"/>
+        <p14:creationId xmlns:p14="http://schemas.microsoft.com/office/powerpoint/2010/main" val="3237519049"/>
       </p:ext>
     </p:extLst>
   </p:cSld>
@@ -2805,7 +2801,7 @@
           <p:cNvPr id="2" name="Titelplatzhalter 1">
             <a:extLst>
               <a:ext uri="{FF2B5EF4-FFF2-40B4-BE49-F238E27FC236}">
-                <a16:creationId xmlns:a16="http://schemas.microsoft.com/office/drawing/2014/main" xmlns="" id="{54BE6E0B-F962-4BB2-85F2-79DA9F5BB6B6}"/>
+                <a16:creationId xmlns:a16="http://schemas.microsoft.com/office/drawing/2014/main" id="{54BE6E0B-F962-4BB2-85F2-79DA9F5BB6B6}"/>
               </a:ext>
             </a:extLst>
           </p:cNvPr>
@@ -2843,7 +2839,7 @@
           <p:cNvPr id="3" name="Textplatzhalter 2">
             <a:extLst>
               <a:ext uri="{FF2B5EF4-FFF2-40B4-BE49-F238E27FC236}">
-                <a16:creationId xmlns:a16="http://schemas.microsoft.com/office/drawing/2014/main" xmlns="" id="{18946F93-E99C-4ACB-B864-AD835F099055}"/>
+                <a16:creationId xmlns:a16="http://schemas.microsoft.com/office/drawing/2014/main" id="{18946F93-E99C-4ACB-B864-AD835F099055}"/>
               </a:ext>
             </a:extLst>
           </p:cNvPr>
@@ -2910,7 +2906,7 @@
           <p:cNvPr id="4" name="Datumsplatzhalter 3">
             <a:extLst>
               <a:ext uri="{FF2B5EF4-FFF2-40B4-BE49-F238E27FC236}">
-                <a16:creationId xmlns:a16="http://schemas.microsoft.com/office/drawing/2014/main" xmlns="" id="{8E602B4D-6F6E-4FA2-8369-DF86CBAD3E38}"/>
+                <a16:creationId xmlns:a16="http://schemas.microsoft.com/office/drawing/2014/main" id="{8E602B4D-6F6E-4FA2-8369-DF86CBAD3E38}"/>
               </a:ext>
             </a:extLst>
           </p:cNvPr>
@@ -2947,7 +2943,7 @@
             <a:fld id="{EF2A35CB-578F-4832-A0CE-F029506BB1A4}" type="datetimeFigureOut">
               <a:rPr lang="de-DE" smtClean="0"/>
               <a:pPr/>
-              <a:t>13.08.2017</a:t>
+              <a:t>28.02.18</a:t>
             </a:fld>
             <a:endParaRPr lang="de-DE"/>
           </a:p>
@@ -2958,7 +2954,7 @@
           <p:cNvPr id="5" name="Fußzeilenplatzhalter 4">
             <a:extLst>
               <a:ext uri="{FF2B5EF4-FFF2-40B4-BE49-F238E27FC236}">
-                <a16:creationId xmlns:a16="http://schemas.microsoft.com/office/drawing/2014/main" xmlns="" id="{A10649EF-44E3-4DA6-8838-879FA663EB40}"/>
+                <a16:creationId xmlns:a16="http://schemas.microsoft.com/office/drawing/2014/main" id="{A10649EF-44E3-4DA6-8838-879FA663EB40}"/>
               </a:ext>
             </a:extLst>
           </p:cNvPr>
@@ -3001,7 +2997,7 @@
           <p:cNvPr id="6" name="Foliennummernplatzhalter 5">
             <a:extLst>
               <a:ext uri="{FF2B5EF4-FFF2-40B4-BE49-F238E27FC236}">
-                <a16:creationId xmlns:a16="http://schemas.microsoft.com/office/drawing/2014/main" xmlns="" id="{A93E2452-11FB-4649-B2DF-34CB7B54B7B2}"/>
+                <a16:creationId xmlns:a16="http://schemas.microsoft.com/office/drawing/2014/main" id="{A93E2452-11FB-4649-B2DF-34CB7B54B7B2}"/>
               </a:ext>
             </a:extLst>
           </p:cNvPr>
@@ -3038,7 +3034,7 @@
             <a:fld id="{C3CA5D77-34DE-49AF-8B1F-A6673D6EB223}" type="slidenum">
               <a:rPr lang="de-DE" smtClean="0"/>
               <a:pPr/>
-              <a:t>‹Nr.›</a:t>
+              <a:t>‹#›</a:t>
             </a:fld>
             <a:endParaRPr lang="de-DE"/>
           </a:p>
@@ -3047,7 +3043,7 @@
     </p:spTree>
     <p:extLst>
       <p:ext uri="{BB962C8B-B14F-4D97-AF65-F5344CB8AC3E}">
-        <p14:creationId xmlns:p14="http://schemas.microsoft.com/office/powerpoint/2010/main" xmlns="" val="1280560501"/>
+        <p14:creationId xmlns:p14="http://schemas.microsoft.com/office/powerpoint/2010/main" val="1280560501"/>
       </p:ext>
     </p:extLst>
   </p:cSld>
@@ -3370,7 +3366,7 @@
           <p:cNvPr id="4" name="Textfeld 3">
             <a:extLst>
               <a:ext uri="{FF2B5EF4-FFF2-40B4-BE49-F238E27FC236}">
-                <a16:creationId xmlns:a16="http://schemas.microsoft.com/office/drawing/2014/main" xmlns="" id="{2919E67D-6871-487B-AE7B-2FB901F842DD}"/>
+                <a16:creationId xmlns:a16="http://schemas.microsoft.com/office/drawing/2014/main" id="{2919E67D-6871-487B-AE7B-2FB901F842DD}"/>
               </a:ext>
             </a:extLst>
           </p:cNvPr>
@@ -3410,7 +3406,7 @@
           <p:cNvPr id="5" name="Textfeld 4">
             <a:extLst>
               <a:ext uri="{FF2B5EF4-FFF2-40B4-BE49-F238E27FC236}">
-                <a16:creationId xmlns:a16="http://schemas.microsoft.com/office/drawing/2014/main" xmlns="" id="{01B7507E-90E6-4B16-8595-64DFAAE00D41}"/>
+                <a16:creationId xmlns:a16="http://schemas.microsoft.com/office/drawing/2014/main" id="{01B7507E-90E6-4B16-8595-64DFAAE00D41}"/>
               </a:ext>
             </a:extLst>
           </p:cNvPr>
@@ -3450,7 +3446,7 @@
           <p:cNvPr id="6" name="Textfeld 5">
             <a:extLst>
               <a:ext uri="{FF2B5EF4-FFF2-40B4-BE49-F238E27FC236}">
-                <a16:creationId xmlns:a16="http://schemas.microsoft.com/office/drawing/2014/main" xmlns="" id="{7A08A28F-5D69-417F-BEAE-3BC6D0F52C84}"/>
+                <a16:creationId xmlns:a16="http://schemas.microsoft.com/office/drawing/2014/main" id="{7A08A28F-5D69-417F-BEAE-3BC6D0F52C84}"/>
               </a:ext>
             </a:extLst>
           </p:cNvPr>
@@ -3493,7 +3489,7 @@
           <p:cNvPr id="7" name="Textfeld 6">
             <a:extLst>
               <a:ext uri="{FF2B5EF4-FFF2-40B4-BE49-F238E27FC236}">
-                <a16:creationId xmlns:a16="http://schemas.microsoft.com/office/drawing/2014/main" xmlns="" id="{180B8DA7-AFC5-4168-B7F8-694E961A2885}"/>
+                <a16:creationId xmlns:a16="http://schemas.microsoft.com/office/drawing/2014/main" id="{180B8DA7-AFC5-4168-B7F8-694E961A2885}"/>
               </a:ext>
             </a:extLst>
           </p:cNvPr>
@@ -3536,7 +3532,7 @@
           <p:cNvPr id="9" name="Textfeld 8">
             <a:extLst>
               <a:ext uri="{FF2B5EF4-FFF2-40B4-BE49-F238E27FC236}">
-                <a16:creationId xmlns:a16="http://schemas.microsoft.com/office/drawing/2014/main" xmlns="" id="{01B7507E-90E6-4B16-8595-64DFAAE00D41}"/>
+                <a16:creationId xmlns:a16="http://schemas.microsoft.com/office/drawing/2014/main" id="{01B7507E-90E6-4B16-8595-64DFAAE00D41}"/>
               </a:ext>
             </a:extLst>
           </p:cNvPr>
@@ -3565,10 +3561,9 @@
           <a:lstStyle/>
           <a:p>
             <a:r>
-              <a:rPr lang="de-DE" sz="1600" dirty="0" smtClean="0"/>
+              <a:rPr lang="de-DE" sz="1600" dirty="0"/>
               <a:t>Informations-quellen</a:t>
             </a:r>
-            <a:endParaRPr lang="de-DE" sz="1600" dirty="0"/>
           </a:p>
         </p:txBody>
       </p:sp>
@@ -3577,7 +3572,7 @@
           <p:cNvPr id="10" name="Textfeld 9">
             <a:extLst>
               <a:ext uri="{FF2B5EF4-FFF2-40B4-BE49-F238E27FC236}">
-                <a16:creationId xmlns:a16="http://schemas.microsoft.com/office/drawing/2014/main" xmlns="" id="{180B8DA7-AFC5-4168-B7F8-694E961A2885}"/>
+                <a16:creationId xmlns:a16="http://schemas.microsoft.com/office/drawing/2014/main" id="{180B8DA7-AFC5-4168-B7F8-694E961A2885}"/>
               </a:ext>
             </a:extLst>
           </p:cNvPr>
@@ -3620,7 +3615,7 @@
           <p:cNvPr id="11" name="Textfeld 10">
             <a:extLst>
               <a:ext uri="{FF2B5EF4-FFF2-40B4-BE49-F238E27FC236}">
-                <a16:creationId xmlns:a16="http://schemas.microsoft.com/office/drawing/2014/main" xmlns="" id="{180B8DA7-AFC5-4168-B7F8-694E961A2885}"/>
+                <a16:creationId xmlns:a16="http://schemas.microsoft.com/office/drawing/2014/main" id="{180B8DA7-AFC5-4168-B7F8-694E961A2885}"/>
               </a:ext>
             </a:extLst>
           </p:cNvPr>
@@ -3660,7 +3655,7 @@
           <p:cNvPr id="13" name="Textfeld 12">
             <a:extLst>
               <a:ext uri="{FF2B5EF4-FFF2-40B4-BE49-F238E27FC236}">
-                <a16:creationId xmlns:a16="http://schemas.microsoft.com/office/drawing/2014/main" xmlns="" id="{78DBED99-7275-4660-B630-6D56E14E00BA}"/>
+                <a16:creationId xmlns:a16="http://schemas.microsoft.com/office/drawing/2014/main" id="{78DBED99-7275-4660-B630-6D56E14E00BA}"/>
               </a:ext>
             </a:extLst>
           </p:cNvPr>
@@ -3707,7 +3702,7 @@
           <p:cNvPr id="15" name="Textfeld 14">
             <a:extLst>
               <a:ext uri="{FF2B5EF4-FFF2-40B4-BE49-F238E27FC236}">
-                <a16:creationId xmlns:a16="http://schemas.microsoft.com/office/drawing/2014/main" xmlns="" id="{E4029F8D-381E-4212-9279-BA230E8439CF}"/>
+                <a16:creationId xmlns:a16="http://schemas.microsoft.com/office/drawing/2014/main" id="{E4029F8D-381E-4212-9279-BA230E8439CF}"/>
               </a:ext>
             </a:extLst>
           </p:cNvPr>
@@ -3761,7 +3756,7 @@
           <p:cNvPr id="17" name="Textfeld 16">
             <a:extLst>
               <a:ext uri="{FF2B5EF4-FFF2-40B4-BE49-F238E27FC236}">
-                <a16:creationId xmlns:a16="http://schemas.microsoft.com/office/drawing/2014/main" xmlns="" id="{EE74940F-9123-464A-B5ED-9539E2F76D57}"/>
+                <a16:creationId xmlns:a16="http://schemas.microsoft.com/office/drawing/2014/main" id="{EE74940F-9123-464A-B5ED-9539E2F76D57}"/>
               </a:ext>
             </a:extLst>
           </p:cNvPr>
@@ -3792,7 +3787,7 @@
             <a:pPr fontAlgn="b"/>
             <a:r>
               <a:rPr lang="de-DE" sz="1050" dirty="0"/>
-              <a:t>Viele Kleine Arbeitsparkette schnüren</a:t>
+              <a:t>Viele kleine Arbeitspakete schnüren</a:t>
             </a:r>
           </a:p>
         </p:txBody>
@@ -3802,7 +3797,7 @@
           <p:cNvPr id="18" name="Textfeld 17">
             <a:extLst>
               <a:ext uri="{FF2B5EF4-FFF2-40B4-BE49-F238E27FC236}">
-                <a16:creationId xmlns:a16="http://schemas.microsoft.com/office/drawing/2014/main" xmlns="" id="{78DBED99-7275-4660-B630-6D56E14E00BA}"/>
+                <a16:creationId xmlns:a16="http://schemas.microsoft.com/office/drawing/2014/main" id="{78DBED99-7275-4660-B630-6D56E14E00BA}"/>
               </a:ext>
             </a:extLst>
           </p:cNvPr>
@@ -3833,7 +3828,7 @@
             <a:pPr fontAlgn="b"/>
             <a:r>
               <a:rPr lang="de-DE" sz="1050" dirty="0"/>
-              <a:t>Klare Belohnung setzten nach einem Lernparket wie Sport oder mit Freundes was Machen</a:t>
+              <a:t>Klare Belohnung setzten nach einem Lernpaket wie Sport oder mit Freundes was machen</a:t>
             </a:r>
             <a:endParaRPr lang="de-DE" sz="1050" dirty="0">
               <a:solidFill>
@@ -3849,7 +3844,7 @@
           <p:cNvPr id="19" name="Textfeld 18">
             <a:extLst>
               <a:ext uri="{FF2B5EF4-FFF2-40B4-BE49-F238E27FC236}">
-                <a16:creationId xmlns:a16="http://schemas.microsoft.com/office/drawing/2014/main" xmlns="" id="{376006C3-CEC6-4E2F-8468-9C2C908BF4DC}"/>
+                <a16:creationId xmlns:a16="http://schemas.microsoft.com/office/drawing/2014/main" id="{376006C3-CEC6-4E2F-8468-9C2C908BF4DC}"/>
               </a:ext>
             </a:extLst>
           </p:cNvPr>
@@ -3918,7 +3913,7 @@
           <p:cNvPr id="20" name="Textfeld 19">
             <a:extLst>
               <a:ext uri="{FF2B5EF4-FFF2-40B4-BE49-F238E27FC236}">
-                <a16:creationId xmlns:a16="http://schemas.microsoft.com/office/drawing/2014/main" xmlns="" id="{6ABE1C13-7C62-4978-BDD5-FF917C63562F}"/>
+                <a16:creationId xmlns:a16="http://schemas.microsoft.com/office/drawing/2014/main" id="{6ABE1C13-7C62-4978-BDD5-FF917C63562F}"/>
               </a:ext>
             </a:extLst>
           </p:cNvPr>
@@ -3949,15 +3944,7 @@
             <a:pPr fontAlgn="b"/>
             <a:r>
               <a:rPr lang="de-DE" sz="1050" dirty="0"/>
-              <a:t>Konditionierung auf </a:t>
-            </a:r>
-            <a:r>
-              <a:rPr lang="de-DE" sz="1050" dirty="0" err="1"/>
-              <a:t>z.B</a:t>
-            </a:r>
-            <a:r>
-              <a:rPr lang="de-DE" sz="1050" dirty="0"/>
-              <a:t> Musik, Kaugummi.</a:t>
+              <a:t>Konditionierung auf z.B. Musik, Kaugummi.</a:t>
             </a:r>
           </a:p>
           <a:p>
@@ -3974,7 +3961,7 @@
           <p:cNvPr id="21" name="Textfeld 20">
             <a:extLst>
               <a:ext uri="{FF2B5EF4-FFF2-40B4-BE49-F238E27FC236}">
-                <a16:creationId xmlns:a16="http://schemas.microsoft.com/office/drawing/2014/main" xmlns="" id="{518BE282-8619-4A49-A78D-2F27C68022BB}"/>
+                <a16:creationId xmlns:a16="http://schemas.microsoft.com/office/drawing/2014/main" id="{518BE282-8619-4A49-A78D-2F27C68022BB}"/>
               </a:ext>
             </a:extLst>
           </p:cNvPr>
@@ -4015,7 +4002,7 @@
           <p:cNvPr id="22" name="Textfeld 21">
             <a:extLst>
               <a:ext uri="{FF2B5EF4-FFF2-40B4-BE49-F238E27FC236}">
-                <a16:creationId xmlns:a16="http://schemas.microsoft.com/office/drawing/2014/main" xmlns="" id="{7421F1C1-1D44-4F03-A3FD-C2171F38CA8E}"/>
+                <a16:creationId xmlns:a16="http://schemas.microsoft.com/office/drawing/2014/main" id="{7421F1C1-1D44-4F03-A3FD-C2171F38CA8E}"/>
               </a:ext>
             </a:extLst>
           </p:cNvPr>
@@ -4046,7 +4033,7 @@
             <a:pPr fontAlgn="b"/>
             <a:r>
               <a:rPr lang="de-DE" sz="1050" dirty="0"/>
-              <a:t>Interessante Felder mit Uninteressanten kombinieren/wechseln</a:t>
+              <a:t>Interessante Felder mit uninteressanten kombinieren/wechseln</a:t>
             </a:r>
           </a:p>
         </p:txBody>
@@ -4056,7 +4043,7 @@
           <p:cNvPr id="24" name="Textfeld 23">
             <a:extLst>
               <a:ext uri="{FF2B5EF4-FFF2-40B4-BE49-F238E27FC236}">
-                <a16:creationId xmlns:a16="http://schemas.microsoft.com/office/drawing/2014/main" xmlns="" id="{72E6149D-B786-49EA-A6F4-720737C43700}"/>
+                <a16:creationId xmlns:a16="http://schemas.microsoft.com/office/drawing/2014/main" id="{72E6149D-B786-49EA-A6F4-720737C43700}"/>
               </a:ext>
             </a:extLst>
           </p:cNvPr>
@@ -4098,7 +4085,7 @@
           <p:cNvPr id="25" name="Textfeld 24">
             <a:extLst>
               <a:ext uri="{FF2B5EF4-FFF2-40B4-BE49-F238E27FC236}">
-                <a16:creationId xmlns:a16="http://schemas.microsoft.com/office/drawing/2014/main" xmlns="" id="{05C6D1C3-CF6C-42C8-B3DA-B9AAEEB22587}"/>
+                <a16:creationId xmlns:a16="http://schemas.microsoft.com/office/drawing/2014/main" id="{05C6D1C3-CF6C-42C8-B3DA-B9AAEEB22587}"/>
               </a:ext>
             </a:extLst>
           </p:cNvPr>
@@ -4139,7 +4126,7 @@
           <p:cNvPr id="26" name="Textfeld 25">
             <a:extLst>
               <a:ext uri="{FF2B5EF4-FFF2-40B4-BE49-F238E27FC236}">
-                <a16:creationId xmlns:a16="http://schemas.microsoft.com/office/drawing/2014/main" xmlns="" id="{B7F880D2-F59A-4CED-B915-4DF6405032E2}"/>
+                <a16:creationId xmlns:a16="http://schemas.microsoft.com/office/drawing/2014/main" id="{B7F880D2-F59A-4CED-B915-4DF6405032E2}"/>
               </a:ext>
             </a:extLst>
           </p:cNvPr>
@@ -4182,23 +4169,8 @@
                 </a:solidFill>
                 <a:latin typeface="Calibri" panose="020F0502020204030204" pitchFamily="34" charset="0"/>
               </a:rPr>
-              <a:t>Wiki-</a:t>
-            </a:r>
-            <a:r>
-              <a:rPr lang="de-DE" sz="1050" dirty="0" err="1">
-                <a:solidFill>
-                  <a:srgbClr val="000000"/>
-                </a:solidFill>
-                <a:latin typeface="Calibri" panose="020F0502020204030204" pitchFamily="34" charset="0"/>
-              </a:rPr>
-              <a:t>Pedia</a:t>
-            </a:r>
-            <a:endParaRPr lang="de-DE" sz="1050" dirty="0">
-              <a:solidFill>
-                <a:srgbClr val="000000"/>
-              </a:solidFill>
-              <a:latin typeface="Calibri" panose="020F0502020204030204" pitchFamily="34" charset="0"/>
-            </a:endParaRPr>
+              <a:t>Wikipedia</a:t>
+            </a:r>
           </a:p>
           <a:p>
             <a:pPr fontAlgn="b"/>
@@ -4219,7 +4191,7 @@
           <p:cNvPr id="27" name="Textfeld 26">
             <a:extLst>
               <a:ext uri="{FF2B5EF4-FFF2-40B4-BE49-F238E27FC236}">
-                <a16:creationId xmlns:a16="http://schemas.microsoft.com/office/drawing/2014/main" xmlns="" id="{5E550000-81EE-4F9C-B5D2-E249CAA0AC0A}"/>
+                <a16:creationId xmlns:a16="http://schemas.microsoft.com/office/drawing/2014/main" id="{5E550000-81EE-4F9C-B5D2-E249CAA0AC0A}"/>
               </a:ext>
             </a:extLst>
           </p:cNvPr>
@@ -4260,7 +4232,7 @@
           <p:cNvPr id="28" name="Textfeld 27">
             <a:extLst>
               <a:ext uri="{FF2B5EF4-FFF2-40B4-BE49-F238E27FC236}">
-                <a16:creationId xmlns:a16="http://schemas.microsoft.com/office/drawing/2014/main" xmlns="" id="{B03539BD-0DFA-402C-981A-A96838B6B351}"/>
+                <a16:creationId xmlns:a16="http://schemas.microsoft.com/office/drawing/2014/main" id="{B03539BD-0DFA-402C-981A-A96838B6B351}"/>
               </a:ext>
             </a:extLst>
           </p:cNvPr>
@@ -4315,7 +4287,7 @@
           <p:cNvPr id="29" name="Textfeld 28">
             <a:extLst>
               <a:ext uri="{FF2B5EF4-FFF2-40B4-BE49-F238E27FC236}">
-                <a16:creationId xmlns:a16="http://schemas.microsoft.com/office/drawing/2014/main" xmlns="" id="{4F23E334-3D09-4DCB-8ED7-28A0B5813DD1}"/>
+                <a16:creationId xmlns:a16="http://schemas.microsoft.com/office/drawing/2014/main" id="{4F23E334-3D09-4DCB-8ED7-28A0B5813DD1}"/>
               </a:ext>
             </a:extLst>
           </p:cNvPr>
@@ -4356,7 +4328,7 @@
           <p:cNvPr id="30" name="Textfeld 29">
             <a:extLst>
               <a:ext uri="{FF2B5EF4-FFF2-40B4-BE49-F238E27FC236}">
-                <a16:creationId xmlns:a16="http://schemas.microsoft.com/office/drawing/2014/main" xmlns="" id="{C9AD9114-F28B-4BD3-B903-3999D24E7DD0}"/>
+                <a16:creationId xmlns:a16="http://schemas.microsoft.com/office/drawing/2014/main" id="{C9AD9114-F28B-4BD3-B903-3999D24E7DD0}"/>
               </a:ext>
             </a:extLst>
           </p:cNvPr>
@@ -4397,7 +4369,7 @@
           <p:cNvPr id="31" name="Textfeld 30">
             <a:extLst>
               <a:ext uri="{FF2B5EF4-FFF2-40B4-BE49-F238E27FC236}">
-                <a16:creationId xmlns:a16="http://schemas.microsoft.com/office/drawing/2014/main" xmlns="" id="{3128EF95-B700-4164-A2E7-7B4DCEB4FC85}"/>
+                <a16:creationId xmlns:a16="http://schemas.microsoft.com/office/drawing/2014/main" id="{3128EF95-B700-4164-A2E7-7B4DCEB4FC85}"/>
               </a:ext>
             </a:extLst>
           </p:cNvPr>
@@ -4438,7 +4410,7 @@
           <p:cNvPr id="3" name="Rechteck 2">
             <a:extLst>
               <a:ext uri="{FF2B5EF4-FFF2-40B4-BE49-F238E27FC236}">
-                <a16:creationId xmlns:a16="http://schemas.microsoft.com/office/drawing/2014/main" xmlns="" id="{311BBBBB-E71A-4D87-9800-3BB1058DBF86}"/>
+                <a16:creationId xmlns:a16="http://schemas.microsoft.com/office/drawing/2014/main" id="{311BBBBB-E71A-4D87-9800-3BB1058DBF86}"/>
               </a:ext>
             </a:extLst>
           </p:cNvPr>
@@ -4489,7 +4461,7 @@
           <p:cNvPr id="33" name="Textfeld 32">
             <a:extLst>
               <a:ext uri="{FF2B5EF4-FFF2-40B4-BE49-F238E27FC236}">
-                <a16:creationId xmlns:a16="http://schemas.microsoft.com/office/drawing/2014/main" xmlns="" id="{23B4D6E4-F2D5-4074-82FD-6C699D851F7D}"/>
+                <a16:creationId xmlns:a16="http://schemas.microsoft.com/office/drawing/2014/main" id="{23B4D6E4-F2D5-4074-82FD-6C699D851F7D}"/>
               </a:ext>
             </a:extLst>
           </p:cNvPr>
@@ -4529,7 +4501,7 @@
           <p:cNvPr id="2" name="Textfeld 1">
             <a:extLst>
               <a:ext uri="{FF2B5EF4-FFF2-40B4-BE49-F238E27FC236}">
-                <a16:creationId xmlns:a16="http://schemas.microsoft.com/office/drawing/2014/main" xmlns="" id="{A5DB42D9-8FA0-4AF2-9C1C-6DF587247C34}"/>
+                <a16:creationId xmlns:a16="http://schemas.microsoft.com/office/drawing/2014/main" id="{A5DB42D9-8FA0-4AF2-9C1C-6DF587247C34}"/>
               </a:ext>
             </a:extLst>
           </p:cNvPr>
@@ -4580,7 +4552,7 @@
           <p:cNvPr id="12" name="Textfeld 11">
             <a:extLst>
               <a:ext uri="{FF2B5EF4-FFF2-40B4-BE49-F238E27FC236}">
-                <a16:creationId xmlns:a16="http://schemas.microsoft.com/office/drawing/2014/main" xmlns="" id="{05D876AA-ABE0-4330-B0B6-639DC864E81D}"/>
+                <a16:creationId xmlns:a16="http://schemas.microsoft.com/office/drawing/2014/main" id="{05D876AA-ABE0-4330-B0B6-639DC864E81D}"/>
               </a:ext>
             </a:extLst>
           </p:cNvPr>
@@ -4620,7 +4592,7 @@
           <p:cNvPr id="32" name="Textfeld 31">
             <a:extLst>
               <a:ext uri="{FF2B5EF4-FFF2-40B4-BE49-F238E27FC236}">
-                <a16:creationId xmlns:a16="http://schemas.microsoft.com/office/drawing/2014/main" xmlns="" id="{C9AD9114-F28B-4BD3-B903-3999D24E7DD0}"/>
+                <a16:creationId xmlns:a16="http://schemas.microsoft.com/office/drawing/2014/main" id="{C9AD9114-F28B-4BD3-B903-3999D24E7DD0}"/>
               </a:ext>
             </a:extLst>
           </p:cNvPr>
@@ -4650,18 +4622,9 @@
           <a:p>
             <a:pPr fontAlgn="b"/>
             <a:r>
-              <a:rPr lang="de-DE" sz="1100" dirty="0" smtClean="0"/>
-              <a:t>Orientierung an </a:t>
-            </a:r>
-            <a:r>
-              <a:rPr lang="de-DE" sz="1100" dirty="0" err="1" smtClean="0"/>
-              <a:t>Buchkaptieln</a:t>
-            </a:r>
-            <a:r>
-              <a:rPr lang="de-DE" sz="1100" dirty="0" smtClean="0"/>
-              <a:t> </a:t>
-            </a:r>
-            <a:endParaRPr lang="de-DE" sz="1100" dirty="0"/>
+              <a:rPr lang="de-DE" sz="1100" dirty="0"/>
+              <a:t>Orientierung an Buchkapiteln </a:t>
+            </a:r>
           </a:p>
         </p:txBody>
       </p:sp>
@@ -4670,7 +4633,7 @@
           <p:cNvPr id="34" name="Textfeld 33">
             <a:extLst>
               <a:ext uri="{FF2B5EF4-FFF2-40B4-BE49-F238E27FC236}">
-                <a16:creationId xmlns:a16="http://schemas.microsoft.com/office/drawing/2014/main" xmlns="" id="{5E550000-81EE-4F9C-B5D2-E249CAA0AC0A}"/>
+                <a16:creationId xmlns:a16="http://schemas.microsoft.com/office/drawing/2014/main" id="{5E550000-81EE-4F9C-B5D2-E249CAA0AC0A}"/>
               </a:ext>
             </a:extLst>
           </p:cNvPr>
@@ -4700,14 +4663,13 @@
           <a:p>
             <a:pPr fontAlgn="b"/>
             <a:r>
-              <a:rPr lang="de-DE" sz="1050" dirty="0" err="1" smtClean="0"/>
+              <a:rPr lang="de-DE" sz="1050" dirty="0" err="1"/>
               <a:t>To</a:t>
             </a:r>
             <a:r>
-              <a:rPr lang="de-DE" sz="1050" dirty="0" smtClean="0"/>
+              <a:rPr lang="de-DE" sz="1050" dirty="0"/>
               <a:t> Do Liste erstellen</a:t>
             </a:r>
-            <a:endParaRPr lang="de-DE" sz="1050" dirty="0"/>
           </a:p>
         </p:txBody>
       </p:sp>
@@ -4716,7 +4678,7 @@
           <p:cNvPr id="35" name="Textfeld 34">
             <a:extLst>
               <a:ext uri="{FF2B5EF4-FFF2-40B4-BE49-F238E27FC236}">
-                <a16:creationId xmlns:a16="http://schemas.microsoft.com/office/drawing/2014/main" xmlns="" id="{4F23E334-3D09-4DCB-8ED7-28A0B5813DD1}"/>
+                <a16:creationId xmlns:a16="http://schemas.microsoft.com/office/drawing/2014/main" id="{4F23E334-3D09-4DCB-8ED7-28A0B5813DD1}"/>
               </a:ext>
             </a:extLst>
           </p:cNvPr>
@@ -4746,10 +4708,25 @@
           <a:p>
             <a:pPr fontAlgn="b"/>
             <a:r>
-              <a:rPr lang="de-DE" sz="1100" dirty="0" smtClean="0"/>
-              <a:t>Das Zimmer zum Lernen benutzen z.B. durch das verwenden von Fensterstiften und Fenster beschreiben oder auf A3 Postern lernen uns sie aufhängen usw.</a:t>
-            </a:r>
-            <a:endParaRPr lang="de-DE" sz="1100" dirty="0"/>
+              <a:rPr lang="de-DE" sz="1100" dirty="0"/>
+              <a:t>Das Zimmer zum Lernen benutzen z.B. durch </a:t>
+            </a:r>
+            <a:r>
+              <a:rPr lang="de-DE" sz="1100"/>
+              <a:t>das Verwenden </a:t>
+            </a:r>
+            <a:r>
+              <a:rPr lang="de-DE" sz="1100" dirty="0"/>
+              <a:t>von Fensterstiften und Fenster beschreiben oder auf A3 Postern </a:t>
+            </a:r>
+            <a:r>
+              <a:rPr lang="de-DE" sz="1100"/>
+              <a:t>lernen und </a:t>
+            </a:r>
+            <a:r>
+              <a:rPr lang="de-DE" sz="1100" dirty="0"/>
+              <a:t>sie aufhängen usw.</a:t>
+            </a:r>
           </a:p>
         </p:txBody>
       </p:sp>
@@ -4759,7 +4736,7 @@
     </p:custDataLst>
     <p:extLst>
       <p:ext uri="{BB962C8B-B14F-4D97-AF65-F5344CB8AC3E}">
-        <p14:creationId xmlns:p14="http://schemas.microsoft.com/office/powerpoint/2010/main" xmlns="" val="3032631312"/>
+        <p14:creationId xmlns:p14="http://schemas.microsoft.com/office/powerpoint/2010/main" val="3032631312"/>
       </p:ext>
     </p:extLst>
   </p:cSld>
@@ -5065,7 +5042,7 @@
   <a:extraClrSchemeLst/>
   <a:extLst>
     <a:ext uri="{05A4C25C-085E-4340-85A3-A5531E510DB2}">
-      <thm15:themeFamily xmlns:thm15="http://schemas.microsoft.com/office/thememl/2012/main" xmlns="" name="Office Theme" id="{62F939B6-93AF-4DB8-9C6B-D6C7DFDC589F}" vid="{4A3C46E8-61CC-4603-A589-7422A47A8E4A}"/>
+      <thm15:themeFamily xmlns:thm15="http://schemas.microsoft.com/office/thememl/2012/main" name="Office Theme" id="{62F939B6-93AF-4DB8-9C6B-D6C7DFDC589F}" vid="{4A3C46E8-61CC-4603-A589-7422A47A8E4A}"/>
     </a:ext>
   </a:extLst>
 </a:theme>

</xml_diff>

<commit_message>
Eintragen der ersten wenigen Lernstrategien fuer Lightbox Slides
</commit_message>
<xml_diff>
--- a/Lernstrategien/Morphologischer Kasten BioPrime.pptx
+++ b/Lernstrategien/Morphologischer Kasten BioPrime.pptx
@@ -4709,23 +4709,7 @@
             <a:pPr fontAlgn="b"/>
             <a:r>
               <a:rPr lang="de-DE" sz="1100" dirty="0"/>
-              <a:t>Das Zimmer zum Lernen benutzen z.B. durch </a:t>
-            </a:r>
-            <a:r>
-              <a:rPr lang="de-DE" sz="1100"/>
-              <a:t>das Verwenden </a:t>
-            </a:r>
-            <a:r>
-              <a:rPr lang="de-DE" sz="1100" dirty="0"/>
-              <a:t>von Fensterstiften und Fenster beschreiben oder auf A3 Postern </a:t>
-            </a:r>
-            <a:r>
-              <a:rPr lang="de-DE" sz="1100"/>
-              <a:t>lernen und </a:t>
-            </a:r>
-            <a:r>
-              <a:rPr lang="de-DE" sz="1100" dirty="0"/>
-              <a:t>sie aufhängen usw.</a:t>
+              <a:t>Das Zimmer zum Lernen benutzen z.B. durch das Verwenden von Fensterstiften und Fenster beschreiben oder auf A3 Postern lernen und. sie aufhängen usw.</a:t>
             </a:r>
           </a:p>
         </p:txBody>

</xml_diff>